<commit_message>
Started Gym2 and added some keyboard controls
</commit_message>
<xml_diff>
--- a/Documents/licart.pptx
+++ b/Documents/licart.pptx
@@ -248,7 +248,7 @@
           <a:p>
             <a:fld id="{89118853-9688-4D3D-BC78-5C03EB5BD2E8}" type="datetimeFigureOut">
               <a:rPr lang="en-US" smtClean="0"/>
-              <a:t>6/2/2025</a:t>
+              <a:t>6/4/2025</a:t>
             </a:fld>
             <a:endParaRPr lang="en-US"/>
           </a:p>
@@ -418,7 +418,7 @@
           <a:p>
             <a:fld id="{89118853-9688-4D3D-BC78-5C03EB5BD2E8}" type="datetimeFigureOut">
               <a:rPr lang="en-US" smtClean="0"/>
-              <a:t>6/2/2025</a:t>
+              <a:t>6/4/2025</a:t>
             </a:fld>
             <a:endParaRPr lang="en-US"/>
           </a:p>
@@ -598,7 +598,7 @@
           <a:p>
             <a:fld id="{89118853-9688-4D3D-BC78-5C03EB5BD2E8}" type="datetimeFigureOut">
               <a:rPr lang="en-US" smtClean="0"/>
-              <a:t>6/2/2025</a:t>
+              <a:t>6/4/2025</a:t>
             </a:fld>
             <a:endParaRPr lang="en-US"/>
           </a:p>
@@ -768,7 +768,7 @@
           <a:p>
             <a:fld id="{89118853-9688-4D3D-BC78-5C03EB5BD2E8}" type="datetimeFigureOut">
               <a:rPr lang="en-US" smtClean="0"/>
-              <a:t>6/2/2025</a:t>
+              <a:t>6/4/2025</a:t>
             </a:fld>
             <a:endParaRPr lang="en-US"/>
           </a:p>
@@ -1014,7 +1014,7 @@
           <a:p>
             <a:fld id="{89118853-9688-4D3D-BC78-5C03EB5BD2E8}" type="datetimeFigureOut">
               <a:rPr lang="en-US" smtClean="0"/>
-              <a:t>6/2/2025</a:t>
+              <a:t>6/4/2025</a:t>
             </a:fld>
             <a:endParaRPr lang="en-US"/>
           </a:p>
@@ -1246,7 +1246,7 @@
           <a:p>
             <a:fld id="{89118853-9688-4D3D-BC78-5C03EB5BD2E8}" type="datetimeFigureOut">
               <a:rPr lang="en-US" smtClean="0"/>
-              <a:t>6/2/2025</a:t>
+              <a:t>6/4/2025</a:t>
             </a:fld>
             <a:endParaRPr lang="en-US"/>
           </a:p>
@@ -1613,7 +1613,7 @@
           <a:p>
             <a:fld id="{89118853-9688-4D3D-BC78-5C03EB5BD2E8}" type="datetimeFigureOut">
               <a:rPr lang="en-US" smtClean="0"/>
-              <a:t>6/2/2025</a:t>
+              <a:t>6/4/2025</a:t>
             </a:fld>
             <a:endParaRPr lang="en-US"/>
           </a:p>
@@ -1731,7 +1731,7 @@
           <a:p>
             <a:fld id="{89118853-9688-4D3D-BC78-5C03EB5BD2E8}" type="datetimeFigureOut">
               <a:rPr lang="en-US" smtClean="0"/>
-              <a:t>6/2/2025</a:t>
+              <a:t>6/4/2025</a:t>
             </a:fld>
             <a:endParaRPr lang="en-US"/>
           </a:p>
@@ -1826,7 +1826,7 @@
           <a:p>
             <a:fld id="{89118853-9688-4D3D-BC78-5C03EB5BD2E8}" type="datetimeFigureOut">
               <a:rPr lang="en-US" smtClean="0"/>
-              <a:t>6/2/2025</a:t>
+              <a:t>6/4/2025</a:t>
             </a:fld>
             <a:endParaRPr lang="en-US"/>
           </a:p>
@@ -2103,7 +2103,7 @@
           <a:p>
             <a:fld id="{89118853-9688-4D3D-BC78-5C03EB5BD2E8}" type="datetimeFigureOut">
               <a:rPr lang="en-US" smtClean="0"/>
-              <a:t>6/2/2025</a:t>
+              <a:t>6/4/2025</a:t>
             </a:fld>
             <a:endParaRPr lang="en-US"/>
           </a:p>
@@ -2360,7 +2360,7 @@
           <a:p>
             <a:fld id="{89118853-9688-4D3D-BC78-5C03EB5BD2E8}" type="datetimeFigureOut">
               <a:rPr lang="en-US" smtClean="0"/>
-              <a:t>6/2/2025</a:t>
+              <a:t>6/4/2025</a:t>
             </a:fld>
             <a:endParaRPr lang="en-US"/>
           </a:p>
@@ -2573,7 +2573,7 @@
           <a:p>
             <a:fld id="{89118853-9688-4D3D-BC78-5C03EB5BD2E8}" type="datetimeFigureOut">
               <a:rPr lang="en-US" smtClean="0"/>
-              <a:t>6/2/2025</a:t>
+              <a:t>6/4/2025</a:t>
             </a:fld>
             <a:endParaRPr lang="en-US"/>
           </a:p>
@@ -22457,7 +22457,7 @@
             <a:avLst/>
           </a:prstGeom>
           <a:solidFill>
-            <a:srgbClr val="F9E1BD"/>
+            <a:srgbClr val="F6D3A0"/>
           </a:solidFill>
           <a:ln>
             <a:noFill/>

</xml_diff>